<commit_message>
new changes in ppt
</commit_message>
<xml_diff>
--- a/Git_demoNEW.pptx
+++ b/Git_demoNEW.pptx
@@ -1466,21 +1466,21 @@
     </dgm:pt>
   </dgm:ptLst>
   <dgm:cxnLst>
-    <dgm:cxn modelId="{0FF4ACB2-913D-4F88-83F4-138A78ED7B84}" type="presOf" srcId="{5C05E4DD-DEA2-4E2C-820E-63E061BFCD58}" destId="{D12AB6A2-2445-4812-B3ED-C58E4AC7E10A}" srcOrd="0" destOrd="0" presId="urn:microsoft.com/office/officeart/2005/8/layout/default"/>
+    <dgm:cxn modelId="{24EAB551-E9D8-4145-866A-6E79F2592C40}" type="presOf" srcId="{F949D02F-7029-4E0B-B75D-5D8FAB200F41}" destId="{7B998F9D-B64C-432A-BB83-696091D01A46}" srcOrd="0" destOrd="0" presId="urn:microsoft.com/office/officeart/2005/8/layout/default"/>
+    <dgm:cxn modelId="{B6CD4CDF-F596-45BD-B264-17AAD6075876}" srcId="{F949D02F-7029-4E0B-B75D-5D8FAB200F41}" destId="{51A21164-86F6-4EEE-AE06-05ACBA132CF3}" srcOrd="5" destOrd="0" parTransId="{56901F22-DB92-44A4-ADF6-FF640A1A419F}" sibTransId="{A0D8A295-5C1B-49C4-A33E-A7964203EE04}"/>
+    <dgm:cxn modelId="{17A2572C-8CF6-46AE-AA31-5F1FEB5441C2}" srcId="{F949D02F-7029-4E0B-B75D-5D8FAB200F41}" destId="{A121A8E0-B3EF-4726-88CB-48D4E078F859}" srcOrd="4" destOrd="0" parTransId="{B3489DB5-E9DA-4A99-B510-62A61FA2BA09}" sibTransId="{2AAF310E-0CC2-4F4D-9384-72B9DD27BBD2}"/>
+    <dgm:cxn modelId="{350DF7E7-A184-450B-B314-203EB2EFD9F2}" type="presOf" srcId="{C10E59D6-7FD0-4335-9B04-A99E944A775B}" destId="{5C0E3769-691E-4EA0-93F5-A76EEADA644D}" srcOrd="0" destOrd="0" presId="urn:microsoft.com/office/officeart/2005/8/layout/default"/>
+    <dgm:cxn modelId="{E7B92DF6-55D2-41F5-87A8-29D33C660667}" type="presOf" srcId="{635E7B8F-B426-4FDE-A07C-D319DEACE341}" destId="{9CE4333A-F9C7-4C37-A892-3EF9D2428C39}" srcOrd="0" destOrd="0" presId="urn:microsoft.com/office/officeart/2005/8/layout/default"/>
+    <dgm:cxn modelId="{47041D96-8DB9-4E16-B08A-989250F241F3}" type="presOf" srcId="{BD3744B4-4B19-4582-92B4-067B48237A1E}" destId="{9721A46A-C73E-4292-A203-6DC7904B4C51}" srcOrd="0" destOrd="0" presId="urn:microsoft.com/office/officeart/2005/8/layout/default"/>
+    <dgm:cxn modelId="{D651B45D-D424-4231-BFAB-1AEAB2FC42FD}" srcId="{F949D02F-7029-4E0B-B75D-5D8FAB200F41}" destId="{C10E59D6-7FD0-4335-9B04-A99E944A775B}" srcOrd="2" destOrd="0" parTransId="{9723C232-F3BD-464D-AEB9-C9475A4D924B}" sibTransId="{7F9DE2C9-CCD7-47DD-9238-19440A0D0E5D}"/>
+    <dgm:cxn modelId="{0E597C3B-48BC-440B-9FAA-726E7359FA28}" srcId="{F949D02F-7029-4E0B-B75D-5D8FAB200F41}" destId="{9C1E3D9B-8C2F-4A69-9FB1-642D23AEAC21}" srcOrd="1" destOrd="0" parTransId="{319F22DB-12AA-4752-8078-A3C18A0C3ABE}" sibTransId="{98110646-42AF-4F39-8474-319CA14D2247}"/>
+    <dgm:cxn modelId="{3911C5A0-E966-4048-BEF6-CC6E35EDB4DA}" srcId="{F949D02F-7029-4E0B-B75D-5D8FAB200F41}" destId="{5C05E4DD-DEA2-4E2C-820E-63E061BFCD58}" srcOrd="3" destOrd="0" parTransId="{058353A0-AACE-4A23-B272-C8F34DA76652}" sibTransId="{AF39B399-B5E4-4972-8E9F-39BD27D755D3}"/>
+    <dgm:cxn modelId="{95BA5B42-B893-45DE-80DB-09B62EC2511B}" type="presOf" srcId="{A121A8E0-B3EF-4726-88CB-48D4E078F859}" destId="{C3F7B2D8-F48C-41D1-90F3-733C552FEFCB}" srcOrd="0" destOrd="0" presId="urn:microsoft.com/office/officeart/2005/8/layout/default"/>
     <dgm:cxn modelId="{3F6EFB8E-C5BC-4064-86CC-9D92D5CE92A8}" srcId="{F949D02F-7029-4E0B-B75D-5D8FAB200F41}" destId="{BD3744B4-4B19-4582-92B4-067B48237A1E}" srcOrd="6" destOrd="0" parTransId="{723ABB8A-F230-472A-91B5-143B3A8899D8}" sibTransId="{DFC88D56-4DCB-4A8B-8266-31150987E829}"/>
     <dgm:cxn modelId="{46A52979-3CF9-4117-9264-855F4B09F9C0}" type="presOf" srcId="{9C1E3D9B-8C2F-4A69-9FB1-642D23AEAC21}" destId="{91EF6036-DE30-4B6E-917D-EBCA62A1E301}" srcOrd="0" destOrd="0" presId="urn:microsoft.com/office/officeart/2005/8/layout/default"/>
-    <dgm:cxn modelId="{350DF7E7-A184-450B-B314-203EB2EFD9F2}" type="presOf" srcId="{C10E59D6-7FD0-4335-9B04-A99E944A775B}" destId="{5C0E3769-691E-4EA0-93F5-A76EEADA644D}" srcOrd="0" destOrd="0" presId="urn:microsoft.com/office/officeart/2005/8/layout/default"/>
-    <dgm:cxn modelId="{0E597C3B-48BC-440B-9FAA-726E7359FA28}" srcId="{F949D02F-7029-4E0B-B75D-5D8FAB200F41}" destId="{9C1E3D9B-8C2F-4A69-9FB1-642D23AEAC21}" srcOrd="1" destOrd="0" parTransId="{319F22DB-12AA-4752-8078-A3C18A0C3ABE}" sibTransId="{98110646-42AF-4F39-8474-319CA14D2247}"/>
-    <dgm:cxn modelId="{47041D96-8DB9-4E16-B08A-989250F241F3}" type="presOf" srcId="{BD3744B4-4B19-4582-92B4-067B48237A1E}" destId="{9721A46A-C73E-4292-A203-6DC7904B4C51}" srcOrd="0" destOrd="0" presId="urn:microsoft.com/office/officeart/2005/8/layout/default"/>
-    <dgm:cxn modelId="{D651B45D-D424-4231-BFAB-1AEAB2FC42FD}" srcId="{F949D02F-7029-4E0B-B75D-5D8FAB200F41}" destId="{C10E59D6-7FD0-4335-9B04-A99E944A775B}" srcOrd="2" destOrd="0" parTransId="{9723C232-F3BD-464D-AEB9-C9475A4D924B}" sibTransId="{7F9DE2C9-CCD7-47DD-9238-19440A0D0E5D}"/>
+    <dgm:cxn modelId="{0FF4ACB2-913D-4F88-83F4-138A78ED7B84}" type="presOf" srcId="{5C05E4DD-DEA2-4E2C-820E-63E061BFCD58}" destId="{D12AB6A2-2445-4812-B3ED-C58E4AC7E10A}" srcOrd="0" destOrd="0" presId="urn:microsoft.com/office/officeart/2005/8/layout/default"/>
     <dgm:cxn modelId="{55196F88-C9D3-45FD-AEC8-C1388827B952}" type="presOf" srcId="{51A21164-86F6-4EEE-AE06-05ACBA132CF3}" destId="{5CB2E680-8EE3-4583-819A-9B48A94B15B6}" srcOrd="0" destOrd="0" presId="urn:microsoft.com/office/officeart/2005/8/layout/default"/>
-    <dgm:cxn modelId="{24EAB551-E9D8-4145-866A-6E79F2592C40}" type="presOf" srcId="{F949D02F-7029-4E0B-B75D-5D8FAB200F41}" destId="{7B998F9D-B64C-432A-BB83-696091D01A46}" srcOrd="0" destOrd="0" presId="urn:microsoft.com/office/officeart/2005/8/layout/default"/>
-    <dgm:cxn modelId="{3911C5A0-E966-4048-BEF6-CC6E35EDB4DA}" srcId="{F949D02F-7029-4E0B-B75D-5D8FAB200F41}" destId="{5C05E4DD-DEA2-4E2C-820E-63E061BFCD58}" srcOrd="3" destOrd="0" parTransId="{058353A0-AACE-4A23-B272-C8F34DA76652}" sibTransId="{AF39B399-B5E4-4972-8E9F-39BD27D755D3}"/>
     <dgm:cxn modelId="{C9742FE8-7789-4870-9662-72D407BA4A15}" srcId="{F949D02F-7029-4E0B-B75D-5D8FAB200F41}" destId="{635E7B8F-B426-4FDE-A07C-D319DEACE341}" srcOrd="0" destOrd="0" parTransId="{F4DC5CE2-030B-44B6-979D-E00927775B28}" sibTransId="{1CB8FFEB-7EE4-4C8A-AED6-D54E26B315E7}"/>
-    <dgm:cxn modelId="{17A2572C-8CF6-46AE-AA31-5F1FEB5441C2}" srcId="{F949D02F-7029-4E0B-B75D-5D8FAB200F41}" destId="{A121A8E0-B3EF-4726-88CB-48D4E078F859}" srcOrd="4" destOrd="0" parTransId="{B3489DB5-E9DA-4A99-B510-62A61FA2BA09}" sibTransId="{2AAF310E-0CC2-4F4D-9384-72B9DD27BBD2}"/>
-    <dgm:cxn modelId="{E7B92DF6-55D2-41F5-87A8-29D33C660667}" type="presOf" srcId="{635E7B8F-B426-4FDE-A07C-D319DEACE341}" destId="{9CE4333A-F9C7-4C37-A892-3EF9D2428C39}" srcOrd="0" destOrd="0" presId="urn:microsoft.com/office/officeart/2005/8/layout/default"/>
-    <dgm:cxn modelId="{B6CD4CDF-F596-45BD-B264-17AAD6075876}" srcId="{F949D02F-7029-4E0B-B75D-5D8FAB200F41}" destId="{51A21164-86F6-4EEE-AE06-05ACBA132CF3}" srcOrd="5" destOrd="0" parTransId="{56901F22-DB92-44A4-ADF6-FF640A1A419F}" sibTransId="{A0D8A295-5C1B-49C4-A33E-A7964203EE04}"/>
-    <dgm:cxn modelId="{95BA5B42-B893-45DE-80DB-09B62EC2511B}" type="presOf" srcId="{A121A8E0-B3EF-4726-88CB-48D4E078F859}" destId="{C3F7B2D8-F48C-41D1-90F3-733C552FEFCB}" srcOrd="0" destOrd="0" presId="urn:microsoft.com/office/officeart/2005/8/layout/default"/>
     <dgm:cxn modelId="{8AAD4727-2E2C-42D0-984D-530B7B12B484}" type="presParOf" srcId="{7B998F9D-B64C-432A-BB83-696091D01A46}" destId="{9CE4333A-F9C7-4C37-A892-3EF9D2428C39}" srcOrd="0" destOrd="0" presId="urn:microsoft.com/office/officeart/2005/8/layout/default"/>
     <dgm:cxn modelId="{98822E5C-E055-492C-B729-67E077453286}" type="presParOf" srcId="{7B998F9D-B64C-432A-BB83-696091D01A46}" destId="{CE8C15D4-1FA2-41C3-9EBD-DC501BE4BEC6}" srcOrd="1" destOrd="0" presId="urn:microsoft.com/office/officeart/2005/8/layout/default"/>
     <dgm:cxn modelId="{A55ACB46-D2A8-4A66-AAB8-62062C171D7B}" type="presParOf" srcId="{7B998F9D-B64C-432A-BB83-696091D01A46}" destId="{91EF6036-DE30-4B6E-917D-EBCA62A1E301}" srcOrd="2" destOrd="0" presId="urn:microsoft.com/office/officeart/2005/8/layout/default"/>
@@ -1513,608 +1513,6 @@
       <dsp:cNvGrpSpPr/>
     </dsp:nvGrpSpPr>
     <dsp:grpSpPr/>
-    <dsp:sp modelId="{9CE4333A-F9C7-4C37-A892-3EF9D2428C39}">
-      <dsp:nvSpPr>
-        <dsp:cNvPr id="0" name=""/>
-        <dsp:cNvSpPr/>
-      </dsp:nvSpPr>
-      <dsp:spPr>
-        <a:xfrm>
-          <a:off x="3080" y="730701"/>
-          <a:ext cx="2444055" cy="1466433"/>
-        </a:xfrm>
-        <a:prstGeom prst="flowChartAlternateProcess">
-          <a:avLst/>
-        </a:prstGeom>
-        <a:solidFill>
-          <a:schemeClr val="accent4">
-            <a:hueOff val="0"/>
-            <a:satOff val="0"/>
-            <a:lumOff val="0"/>
-            <a:alphaOff val="0"/>
-          </a:schemeClr>
-        </a:solidFill>
-        <a:ln w="12700" cap="flat" cmpd="sng" algn="ctr">
-          <a:solidFill>
-            <a:schemeClr val="lt1">
-              <a:hueOff val="0"/>
-              <a:satOff val="0"/>
-              <a:lumOff val="0"/>
-              <a:alphaOff val="0"/>
-            </a:schemeClr>
-          </a:solidFill>
-          <a:prstDash val="solid"/>
-          <a:miter lim="800000"/>
-        </a:ln>
-        <a:effectLst/>
-      </dsp:spPr>
-      <dsp:style>
-        <a:lnRef idx="2">
-          <a:scrgbClr r="0" g="0" b="0"/>
-        </a:lnRef>
-        <a:fillRef idx="1">
-          <a:scrgbClr r="0" g="0" b="0"/>
-        </a:fillRef>
-        <a:effectRef idx="0">
-          <a:scrgbClr r="0" g="0" b="0"/>
-        </a:effectRef>
-        <a:fontRef idx="minor">
-          <a:schemeClr val="lt1"/>
-        </a:fontRef>
-      </dsp:style>
-      <dsp:txBody>
-        <a:bodyPr spcFirstLastPara="0" vert="horz" wrap="square" lIns="76200" tIns="76200" rIns="76200" bIns="76200" numCol="1" spcCol="1270" anchor="ctr" anchorCtr="0">
-          <a:noAutofit/>
-        </a:bodyPr>
-        <a:lstStyle/>
-        <a:p>
-          <a:pPr lvl="0" algn="ctr" defTabSz="889000">
-            <a:lnSpc>
-              <a:spcPct val="90000"/>
-            </a:lnSpc>
-            <a:spcBef>
-              <a:spcPct val="0"/>
-            </a:spcBef>
-            <a:spcAft>
-              <a:spcPct val="35000"/>
-            </a:spcAft>
-          </a:pPr>
-          <a:r>
-            <a:rPr lang="en-US" sz="2000" kern="1200" smtClean="0">
-              <a:solidFill>
-                <a:schemeClr val="tx1"/>
-              </a:solidFill>
-            </a:rPr>
-            <a:t>Branching and Merging</a:t>
-          </a:r>
-          <a:endParaRPr lang="en-IN" sz="2000" kern="1200" dirty="0">
-            <a:solidFill>
-              <a:schemeClr val="tx1"/>
-            </a:solidFill>
-          </a:endParaRPr>
-        </a:p>
-      </dsp:txBody>
-      <dsp:txXfrm>
-        <a:off x="74664" y="802285"/>
-        <a:ext cx="2300887" cy="1323265"/>
-      </dsp:txXfrm>
-    </dsp:sp>
-    <dsp:sp modelId="{91EF6036-DE30-4B6E-917D-EBCA62A1E301}">
-      <dsp:nvSpPr>
-        <dsp:cNvPr id="0" name=""/>
-        <dsp:cNvSpPr/>
-      </dsp:nvSpPr>
-      <dsp:spPr>
-        <a:xfrm>
-          <a:off x="2691541" y="730701"/>
-          <a:ext cx="2444055" cy="1466433"/>
-        </a:xfrm>
-        <a:prstGeom prst="flowChartAlternateProcess">
-          <a:avLst/>
-        </a:prstGeom>
-        <a:solidFill>
-          <a:schemeClr val="accent4">
-            <a:hueOff val="1732615"/>
-            <a:satOff val="-7995"/>
-            <a:lumOff val="294"/>
-            <a:alphaOff val="0"/>
-          </a:schemeClr>
-        </a:solidFill>
-        <a:ln w="12700" cap="flat" cmpd="sng" algn="ctr">
-          <a:solidFill>
-            <a:schemeClr val="lt1">
-              <a:hueOff val="0"/>
-              <a:satOff val="0"/>
-              <a:lumOff val="0"/>
-              <a:alphaOff val="0"/>
-            </a:schemeClr>
-          </a:solidFill>
-          <a:prstDash val="solid"/>
-          <a:miter lim="800000"/>
-        </a:ln>
-        <a:effectLst/>
-      </dsp:spPr>
-      <dsp:style>
-        <a:lnRef idx="2">
-          <a:scrgbClr r="0" g="0" b="0"/>
-        </a:lnRef>
-        <a:fillRef idx="1">
-          <a:scrgbClr r="0" g="0" b="0"/>
-        </a:fillRef>
-        <a:effectRef idx="0">
-          <a:scrgbClr r="0" g="0" b="0"/>
-        </a:effectRef>
-        <a:fontRef idx="minor">
-          <a:schemeClr val="lt1"/>
-        </a:fontRef>
-      </dsp:style>
-      <dsp:txBody>
-        <a:bodyPr spcFirstLastPara="0" vert="horz" wrap="square" lIns="76200" tIns="76200" rIns="76200" bIns="76200" numCol="1" spcCol="1270" anchor="ctr" anchorCtr="0">
-          <a:noAutofit/>
-        </a:bodyPr>
-        <a:lstStyle/>
-        <a:p>
-          <a:pPr lvl="0" algn="ctr" defTabSz="889000">
-            <a:lnSpc>
-              <a:spcPct val="90000"/>
-            </a:lnSpc>
-            <a:spcBef>
-              <a:spcPct val="0"/>
-            </a:spcBef>
-            <a:spcAft>
-              <a:spcPct val="35000"/>
-            </a:spcAft>
-          </a:pPr>
-          <a:r>
-            <a:rPr lang="en-IN" sz="2000" kern="1200" smtClean="0">
-              <a:solidFill>
-                <a:schemeClr val="tx1"/>
-              </a:solidFill>
-            </a:rPr>
-            <a:t>Small and Fast </a:t>
-          </a:r>
-          <a:endParaRPr lang="en-IN" sz="2000" kern="1200" dirty="0">
-            <a:solidFill>
-              <a:schemeClr val="tx1"/>
-            </a:solidFill>
-          </a:endParaRPr>
-        </a:p>
-      </dsp:txBody>
-      <dsp:txXfrm>
-        <a:off x="2763125" y="802285"/>
-        <a:ext cx="2300887" cy="1323265"/>
-      </dsp:txXfrm>
-    </dsp:sp>
-    <dsp:sp modelId="{5C0E3769-691E-4EA0-93F5-A76EEADA644D}">
-      <dsp:nvSpPr>
-        <dsp:cNvPr id="0" name=""/>
-        <dsp:cNvSpPr/>
-      </dsp:nvSpPr>
-      <dsp:spPr>
-        <a:xfrm>
-          <a:off x="5380002" y="730701"/>
-          <a:ext cx="2444055" cy="1466433"/>
-        </a:xfrm>
-        <a:prstGeom prst="flowChartAlternateProcess">
-          <a:avLst/>
-        </a:prstGeom>
-        <a:solidFill>
-          <a:schemeClr val="accent4">
-            <a:hueOff val="3465231"/>
-            <a:satOff val="-15989"/>
-            <a:lumOff val="588"/>
-            <a:alphaOff val="0"/>
-          </a:schemeClr>
-        </a:solidFill>
-        <a:ln w="12700" cap="flat" cmpd="sng" algn="ctr">
-          <a:solidFill>
-            <a:schemeClr val="lt1">
-              <a:hueOff val="0"/>
-              <a:satOff val="0"/>
-              <a:lumOff val="0"/>
-              <a:alphaOff val="0"/>
-            </a:schemeClr>
-          </a:solidFill>
-          <a:prstDash val="solid"/>
-          <a:miter lim="800000"/>
-        </a:ln>
-        <a:effectLst/>
-      </dsp:spPr>
-      <dsp:style>
-        <a:lnRef idx="2">
-          <a:scrgbClr r="0" g="0" b="0"/>
-        </a:lnRef>
-        <a:fillRef idx="1">
-          <a:scrgbClr r="0" g="0" b="0"/>
-        </a:fillRef>
-        <a:effectRef idx="0">
-          <a:scrgbClr r="0" g="0" b="0"/>
-        </a:effectRef>
-        <a:fontRef idx="minor">
-          <a:schemeClr val="lt1"/>
-        </a:fontRef>
-      </dsp:style>
-      <dsp:txBody>
-        <a:bodyPr spcFirstLastPara="0" vert="horz" wrap="square" lIns="76200" tIns="76200" rIns="76200" bIns="76200" numCol="1" spcCol="1270" anchor="ctr" anchorCtr="0">
-          <a:noAutofit/>
-        </a:bodyPr>
-        <a:lstStyle/>
-        <a:p>
-          <a:pPr lvl="0" algn="ctr" defTabSz="889000">
-            <a:lnSpc>
-              <a:spcPct val="90000"/>
-            </a:lnSpc>
-            <a:spcBef>
-              <a:spcPct val="0"/>
-            </a:spcBef>
-            <a:spcAft>
-              <a:spcPct val="35000"/>
-            </a:spcAft>
-          </a:pPr>
-          <a:r>
-            <a:rPr lang="en-IN" sz="2000" kern="1200" smtClean="0">
-              <a:solidFill>
-                <a:schemeClr val="tx1"/>
-              </a:solidFill>
-            </a:rPr>
-            <a:t>Distributed</a:t>
-          </a:r>
-          <a:endParaRPr lang="en-IN" sz="2000" kern="1200" dirty="0">
-            <a:solidFill>
-              <a:schemeClr val="tx1"/>
-            </a:solidFill>
-          </a:endParaRPr>
-        </a:p>
-      </dsp:txBody>
-      <dsp:txXfrm>
-        <a:off x="5451586" y="802285"/>
-        <a:ext cx="2300887" cy="1323265"/>
-      </dsp:txXfrm>
-    </dsp:sp>
-    <dsp:sp modelId="{D12AB6A2-2445-4812-B3ED-C58E4AC7E10A}">
-      <dsp:nvSpPr>
-        <dsp:cNvPr id="0" name=""/>
-        <dsp:cNvSpPr/>
-      </dsp:nvSpPr>
-      <dsp:spPr>
-        <a:xfrm>
-          <a:off x="8068463" y="730701"/>
-          <a:ext cx="2444055" cy="1466433"/>
-        </a:xfrm>
-        <a:prstGeom prst="flowChartAlternateProcess">
-          <a:avLst/>
-        </a:prstGeom>
-        <a:solidFill>
-          <a:schemeClr val="accent4">
-            <a:hueOff val="5197846"/>
-            <a:satOff val="-23984"/>
-            <a:lumOff val="883"/>
-            <a:alphaOff val="0"/>
-          </a:schemeClr>
-        </a:solidFill>
-        <a:ln w="12700" cap="flat" cmpd="sng" algn="ctr">
-          <a:solidFill>
-            <a:schemeClr val="lt1">
-              <a:hueOff val="0"/>
-              <a:satOff val="0"/>
-              <a:lumOff val="0"/>
-              <a:alphaOff val="0"/>
-            </a:schemeClr>
-          </a:solidFill>
-          <a:prstDash val="solid"/>
-          <a:miter lim="800000"/>
-        </a:ln>
-        <a:effectLst/>
-      </dsp:spPr>
-      <dsp:style>
-        <a:lnRef idx="2">
-          <a:scrgbClr r="0" g="0" b="0"/>
-        </a:lnRef>
-        <a:fillRef idx="1">
-          <a:scrgbClr r="0" g="0" b="0"/>
-        </a:fillRef>
-        <a:effectRef idx="0">
-          <a:scrgbClr r="0" g="0" b="0"/>
-        </a:effectRef>
-        <a:fontRef idx="minor">
-          <a:schemeClr val="lt1"/>
-        </a:fontRef>
-      </dsp:style>
-      <dsp:txBody>
-        <a:bodyPr spcFirstLastPara="0" vert="horz" wrap="square" lIns="76200" tIns="76200" rIns="76200" bIns="76200" numCol="1" spcCol="1270" anchor="ctr" anchorCtr="0">
-          <a:noAutofit/>
-        </a:bodyPr>
-        <a:lstStyle/>
-        <a:p>
-          <a:pPr lvl="0" algn="ctr" defTabSz="889000">
-            <a:lnSpc>
-              <a:spcPct val="90000"/>
-            </a:lnSpc>
-            <a:spcBef>
-              <a:spcPct val="0"/>
-            </a:spcBef>
-            <a:spcAft>
-              <a:spcPct val="35000"/>
-            </a:spcAft>
-          </a:pPr>
-          <a:r>
-            <a:rPr lang="en-IN" sz="2000" kern="1200" smtClean="0">
-              <a:solidFill>
-                <a:schemeClr val="tx1"/>
-              </a:solidFill>
-            </a:rPr>
-            <a:t>Data Assurance</a:t>
-          </a:r>
-          <a:endParaRPr lang="en-IN" sz="2000" kern="1200" dirty="0">
-            <a:solidFill>
-              <a:schemeClr val="tx1"/>
-            </a:solidFill>
-          </a:endParaRPr>
-        </a:p>
-      </dsp:txBody>
-      <dsp:txXfrm>
-        <a:off x="8140047" y="802285"/>
-        <a:ext cx="2300887" cy="1323265"/>
-      </dsp:txXfrm>
-    </dsp:sp>
-    <dsp:sp modelId="{C3F7B2D8-F48C-41D1-90F3-733C552FEFCB}">
-      <dsp:nvSpPr>
-        <dsp:cNvPr id="0" name=""/>
-        <dsp:cNvSpPr/>
-      </dsp:nvSpPr>
-      <dsp:spPr>
-        <a:xfrm>
-          <a:off x="1347311" y="2441540"/>
-          <a:ext cx="2444055" cy="1466433"/>
-        </a:xfrm>
-        <a:prstGeom prst="flowChartAlternateProcess">
-          <a:avLst/>
-        </a:prstGeom>
-        <a:solidFill>
-          <a:schemeClr val="accent4">
-            <a:hueOff val="6930461"/>
-            <a:satOff val="-31979"/>
-            <a:lumOff val="1177"/>
-            <a:alphaOff val="0"/>
-          </a:schemeClr>
-        </a:solidFill>
-        <a:ln w="12700" cap="flat" cmpd="sng" algn="ctr">
-          <a:solidFill>
-            <a:schemeClr val="lt1">
-              <a:hueOff val="0"/>
-              <a:satOff val="0"/>
-              <a:lumOff val="0"/>
-              <a:alphaOff val="0"/>
-            </a:schemeClr>
-          </a:solidFill>
-          <a:prstDash val="solid"/>
-          <a:miter lim="800000"/>
-        </a:ln>
-        <a:effectLst/>
-      </dsp:spPr>
-      <dsp:style>
-        <a:lnRef idx="2">
-          <a:scrgbClr r="0" g="0" b="0"/>
-        </a:lnRef>
-        <a:fillRef idx="1">
-          <a:scrgbClr r="0" g="0" b="0"/>
-        </a:fillRef>
-        <a:effectRef idx="0">
-          <a:scrgbClr r="0" g="0" b="0"/>
-        </a:effectRef>
-        <a:fontRef idx="minor">
-          <a:schemeClr val="lt1"/>
-        </a:fontRef>
-      </dsp:style>
-      <dsp:txBody>
-        <a:bodyPr spcFirstLastPara="0" vert="horz" wrap="square" lIns="76200" tIns="76200" rIns="76200" bIns="76200" numCol="1" spcCol="1270" anchor="ctr" anchorCtr="0">
-          <a:noAutofit/>
-        </a:bodyPr>
-        <a:lstStyle/>
-        <a:p>
-          <a:pPr lvl="0" algn="ctr" defTabSz="889000">
-            <a:lnSpc>
-              <a:spcPct val="90000"/>
-            </a:lnSpc>
-            <a:spcBef>
-              <a:spcPct val="0"/>
-            </a:spcBef>
-            <a:spcAft>
-              <a:spcPct val="35000"/>
-            </a:spcAft>
-          </a:pPr>
-          <a:r>
-            <a:rPr lang="en-IN" sz="2000" kern="1200" smtClean="0">
-              <a:solidFill>
-                <a:schemeClr val="tx1"/>
-              </a:solidFill>
-            </a:rPr>
-            <a:t>Traceability</a:t>
-          </a:r>
-          <a:endParaRPr lang="en-IN" sz="2000" kern="1200" dirty="0">
-            <a:solidFill>
-              <a:schemeClr val="tx1"/>
-            </a:solidFill>
-          </a:endParaRPr>
-        </a:p>
-      </dsp:txBody>
-      <dsp:txXfrm>
-        <a:off x="1418895" y="2513124"/>
-        <a:ext cx="2300887" cy="1323265"/>
-      </dsp:txXfrm>
-    </dsp:sp>
-    <dsp:sp modelId="{5CB2E680-8EE3-4583-819A-9B48A94B15B6}">
-      <dsp:nvSpPr>
-        <dsp:cNvPr id="0" name=""/>
-        <dsp:cNvSpPr/>
-      </dsp:nvSpPr>
-      <dsp:spPr>
-        <a:xfrm>
-          <a:off x="4035772" y="2441540"/>
-          <a:ext cx="2444055" cy="1466433"/>
-        </a:xfrm>
-        <a:prstGeom prst="flowChartAlternateProcess">
-          <a:avLst/>
-        </a:prstGeom>
-        <a:solidFill>
-          <a:schemeClr val="accent4">
-            <a:hueOff val="8663077"/>
-            <a:satOff val="-39973"/>
-            <a:lumOff val="1471"/>
-            <a:alphaOff val="0"/>
-          </a:schemeClr>
-        </a:solidFill>
-        <a:ln w="12700" cap="flat" cmpd="sng" algn="ctr">
-          <a:solidFill>
-            <a:schemeClr val="lt1">
-              <a:hueOff val="0"/>
-              <a:satOff val="0"/>
-              <a:lumOff val="0"/>
-              <a:alphaOff val="0"/>
-            </a:schemeClr>
-          </a:solidFill>
-          <a:prstDash val="solid"/>
-          <a:miter lim="800000"/>
-        </a:ln>
-        <a:effectLst/>
-      </dsp:spPr>
-      <dsp:style>
-        <a:lnRef idx="2">
-          <a:scrgbClr r="0" g="0" b="0"/>
-        </a:lnRef>
-        <a:fillRef idx="1">
-          <a:scrgbClr r="0" g="0" b="0"/>
-        </a:fillRef>
-        <a:effectRef idx="0">
-          <a:scrgbClr r="0" g="0" b="0"/>
-        </a:effectRef>
-        <a:fontRef idx="minor">
-          <a:schemeClr val="lt1"/>
-        </a:fontRef>
-      </dsp:style>
-      <dsp:txBody>
-        <a:bodyPr spcFirstLastPara="0" vert="horz" wrap="square" lIns="76200" tIns="76200" rIns="76200" bIns="76200" numCol="1" spcCol="1270" anchor="ctr" anchorCtr="0">
-          <a:noAutofit/>
-        </a:bodyPr>
-        <a:lstStyle/>
-        <a:p>
-          <a:pPr lvl="0" algn="ctr" defTabSz="889000">
-            <a:lnSpc>
-              <a:spcPct val="90000"/>
-            </a:lnSpc>
-            <a:spcBef>
-              <a:spcPct val="0"/>
-            </a:spcBef>
-            <a:spcAft>
-              <a:spcPct val="35000"/>
-            </a:spcAft>
-          </a:pPr>
-          <a:r>
-            <a:rPr lang="en-IN" sz="2000" kern="1200" smtClean="0">
-              <a:solidFill>
-                <a:schemeClr val="tx1"/>
-              </a:solidFill>
-            </a:rPr>
-            <a:t>Staging Area</a:t>
-          </a:r>
-          <a:endParaRPr lang="en-IN" sz="2000" kern="1200" dirty="0">
-            <a:solidFill>
-              <a:schemeClr val="tx1"/>
-            </a:solidFill>
-          </a:endParaRPr>
-        </a:p>
-      </dsp:txBody>
-      <dsp:txXfrm>
-        <a:off x="4107356" y="2513124"/>
-        <a:ext cx="2300887" cy="1323265"/>
-      </dsp:txXfrm>
-    </dsp:sp>
-    <dsp:sp modelId="{9721A46A-C73E-4292-A203-6DC7904B4C51}">
-      <dsp:nvSpPr>
-        <dsp:cNvPr id="0" name=""/>
-        <dsp:cNvSpPr/>
-      </dsp:nvSpPr>
-      <dsp:spPr>
-        <a:xfrm>
-          <a:off x="6724233" y="2441540"/>
-          <a:ext cx="2444055" cy="1466433"/>
-        </a:xfrm>
-        <a:prstGeom prst="flowChartAlternateProcess">
-          <a:avLst/>
-        </a:prstGeom>
-        <a:solidFill>
-          <a:schemeClr val="accent4">
-            <a:hueOff val="10395692"/>
-            <a:satOff val="-47968"/>
-            <a:lumOff val="1765"/>
-            <a:alphaOff val="0"/>
-          </a:schemeClr>
-        </a:solidFill>
-        <a:ln w="12700" cap="flat" cmpd="sng" algn="ctr">
-          <a:solidFill>
-            <a:schemeClr val="lt1">
-              <a:hueOff val="0"/>
-              <a:satOff val="0"/>
-              <a:lumOff val="0"/>
-              <a:alphaOff val="0"/>
-            </a:schemeClr>
-          </a:solidFill>
-          <a:prstDash val="solid"/>
-          <a:miter lim="800000"/>
-        </a:ln>
-        <a:effectLst/>
-      </dsp:spPr>
-      <dsp:style>
-        <a:lnRef idx="2">
-          <a:scrgbClr r="0" g="0" b="0"/>
-        </a:lnRef>
-        <a:fillRef idx="1">
-          <a:scrgbClr r="0" g="0" b="0"/>
-        </a:fillRef>
-        <a:effectRef idx="0">
-          <a:scrgbClr r="0" g="0" b="0"/>
-        </a:effectRef>
-        <a:fontRef idx="minor">
-          <a:schemeClr val="lt1"/>
-        </a:fontRef>
-      </dsp:style>
-      <dsp:txBody>
-        <a:bodyPr spcFirstLastPara="0" vert="horz" wrap="square" lIns="76200" tIns="76200" rIns="76200" bIns="76200" numCol="1" spcCol="1270" anchor="ctr" anchorCtr="0">
-          <a:noAutofit/>
-        </a:bodyPr>
-        <a:lstStyle/>
-        <a:p>
-          <a:pPr lvl="0" algn="ctr" defTabSz="889000">
-            <a:lnSpc>
-              <a:spcPct val="90000"/>
-            </a:lnSpc>
-            <a:spcBef>
-              <a:spcPct val="0"/>
-            </a:spcBef>
-            <a:spcAft>
-              <a:spcPct val="35000"/>
-            </a:spcAft>
-          </a:pPr>
-          <a:r>
-            <a:rPr lang="en-US" sz="2000" kern="1200" smtClean="0">
-              <a:solidFill>
-                <a:schemeClr val="tx1"/>
-              </a:solidFill>
-            </a:rPr>
-            <a:t>Pull requests </a:t>
-          </a:r>
-          <a:endParaRPr lang="en-IN" sz="2000" kern="1200" dirty="0">
-            <a:solidFill>
-              <a:schemeClr val="tx1"/>
-            </a:solidFill>
-          </a:endParaRPr>
-        </a:p>
-      </dsp:txBody>
-      <dsp:txXfrm>
-        <a:off x="6795817" y="2513124"/>
-        <a:ext cx="2300887" cy="1323265"/>
-      </dsp:txXfrm>
-    </dsp:sp>
   </dsp:spTree>
 </dsp:drawing>
 </file>
@@ -3382,7 +2780,7 @@
           <a:p>
             <a:fld id="{5FAD6A44-76D5-4629-B112-D8D3280F26DA}" type="datetimeFigureOut">
               <a:rPr lang="en-IN" smtClean="0"/>
-              <a:t>31-07-2018</a:t>
+              <a:t>02-08-2018</a:t>
             </a:fld>
             <a:endParaRPr lang="en-IN"/>
           </a:p>
@@ -3547,7 +2945,7 @@
           <a:p>
             <a:fld id="{D48AC1C7-3343-4BE0-9391-C371A4A245E1}" type="datetimeFigureOut">
               <a:rPr lang="en-IN" smtClean="0"/>
-              <a:t>31-07-2018</a:t>
+              <a:t>02-08-2018</a:t>
             </a:fld>
             <a:endParaRPr lang="en-IN"/>
           </a:p>
@@ -4315,7 +3713,7 @@
           <a:p>
             <a:fld id="{E196F257-791B-497F-B0A3-6035076E4E03}" type="datetimeFigureOut">
               <a:rPr lang="en-IN" smtClean="0"/>
-              <a:t>31-07-2018</a:t>
+              <a:t>02-08-2018</a:t>
             </a:fld>
             <a:endParaRPr lang="en-IN"/>
           </a:p>
@@ -4577,7 +3975,7 @@
           <a:p>
             <a:fld id="{E196F257-791B-497F-B0A3-6035076E4E03}" type="datetimeFigureOut">
               <a:rPr lang="en-IN" smtClean="0"/>
-              <a:t>31-07-2018</a:t>
+              <a:t>02-08-2018</a:t>
             </a:fld>
             <a:endParaRPr lang="en-IN"/>
           </a:p>
@@ -4849,7 +4247,7 @@
           <a:p>
             <a:fld id="{E196F257-791B-497F-B0A3-6035076E4E03}" type="datetimeFigureOut">
               <a:rPr lang="en-IN" smtClean="0"/>
-              <a:t>31-07-2018</a:t>
+              <a:t>02-08-2018</a:t>
             </a:fld>
             <a:endParaRPr lang="en-IN"/>
           </a:p>
@@ -6033,7 +5431,7 @@
           <a:p>
             <a:fld id="{E196F257-791B-497F-B0A3-6035076E4E03}" type="datetimeFigureOut">
               <a:rPr lang="en-IN" smtClean="0"/>
-              <a:t>31-07-2018</a:t>
+              <a:t>02-08-2018</a:t>
             </a:fld>
             <a:endParaRPr lang="en-IN"/>
           </a:p>
@@ -6371,7 +5769,7 @@
           <a:p>
             <a:fld id="{E196F257-791B-497F-B0A3-6035076E4E03}" type="datetimeFigureOut">
               <a:rPr lang="en-IN" smtClean="0"/>
-              <a:t>31-07-2018</a:t>
+              <a:t>02-08-2018</a:t>
             </a:fld>
             <a:endParaRPr lang="en-IN"/>
           </a:p>
@@ -7014,7 +6412,7 @@
           <a:p>
             <a:fld id="{E196F257-791B-497F-B0A3-6035076E4E03}" type="datetimeFigureOut">
               <a:rPr lang="en-IN" smtClean="0"/>
-              <a:t>31-07-2018</a:t>
+              <a:t>02-08-2018</a:t>
             </a:fld>
             <a:endParaRPr lang="en-IN"/>
           </a:p>
@@ -7224,7 +6622,7 @@
           <a:p>
             <a:fld id="{E196F257-791B-497F-B0A3-6035076E4E03}" type="datetimeFigureOut">
               <a:rPr lang="en-IN" smtClean="0"/>
-              <a:t>31-07-2018</a:t>
+              <a:t>02-08-2018</a:t>
             </a:fld>
             <a:endParaRPr lang="en-IN"/>
           </a:p>
@@ -7411,7 +6809,7 @@
           <a:p>
             <a:fld id="{E196F257-791B-497F-B0A3-6035076E4E03}" type="datetimeFigureOut">
               <a:rPr lang="en-IN" smtClean="0"/>
-              <a:t>31-07-2018</a:t>
+              <a:t>02-08-2018</a:t>
             </a:fld>
             <a:endParaRPr lang="en-IN"/>
           </a:p>
@@ -7780,7 +7178,7 @@
           <a:p>
             <a:fld id="{E196F257-791B-497F-B0A3-6035076E4E03}" type="datetimeFigureOut">
               <a:rPr lang="en-IN" smtClean="0"/>
-              <a:t>31-07-2018</a:t>
+              <a:t>02-08-2018</a:t>
             </a:fld>
             <a:endParaRPr lang="en-IN"/>
           </a:p>
@@ -9116,13 +8514,7 @@
               <a:rPr lang="en-IN" sz="1800" b="1" i="1" dirty="0">
                 <a:latin typeface="Century Gothic" panose="020B0502020202020204" pitchFamily="34" charset="0"/>
               </a:rPr>
-              <a:t>git fetch [</a:t>
-            </a:r>
-            <a:r>
-              <a:rPr lang="en-IN" sz="1800" b="1" i="1" dirty="0" smtClean="0">
-                <a:latin typeface="Century Gothic" panose="020B0502020202020204" pitchFamily="34" charset="0"/>
-              </a:rPr>
-              <a:t>bookmark]</a:t>
+              <a:t>git fetch </a:t>
             </a:r>
             <a:endParaRPr lang="en-US" sz="1800" b="1" i="1" dirty="0" smtClean="0">
               <a:latin typeface="Century Gothic" panose="020B0502020202020204" pitchFamily="34" charset="0"/>
@@ -9165,9 +8557,6 @@
               </a:rPr>
               <a:t>repository</a:t>
             </a:r>
-            <a:endParaRPr lang="en-US" altLang="en-US" sz="1800" dirty="0">
-              <a:latin typeface="Century Gothic" panose="020B0502020202020204" pitchFamily="34" charset="0"/>
-            </a:endParaRPr>
           </a:p>
           <a:p>
             <a:pPr marL="457200" lvl="1" indent="0">
@@ -9176,6 +8565,50 @@
               </a:lnSpc>
               <a:buNone/>
             </a:pPr>
+            <a:endParaRPr lang="en-US" altLang="en-US" sz="1800" dirty="0">
+              <a:latin typeface="Century Gothic" panose="020B0502020202020204" pitchFamily="34" charset="0"/>
+            </a:endParaRPr>
+          </a:p>
+          <a:p>
+            <a:pPr marL="457200" lvl="1" indent="0">
+              <a:lnSpc>
+                <a:spcPct val="110000"/>
+              </a:lnSpc>
+              <a:buNone/>
+            </a:pPr>
+            <a:endParaRPr lang="en-US" altLang="en-US" sz="1800" dirty="0">
+              <a:latin typeface="Century Gothic" panose="020B0502020202020204" pitchFamily="34" charset="0"/>
+            </a:endParaRPr>
+          </a:p>
+          <a:p>
+            <a:pPr marL="457200" lvl="1" indent="0">
+              <a:lnSpc>
+                <a:spcPct val="110000"/>
+              </a:lnSpc>
+              <a:buNone/>
+            </a:pPr>
+            <a:endParaRPr lang="en-IN" sz="1800" b="1" i="1" dirty="0" smtClean="0">
+              <a:latin typeface="Century Gothic" panose="020B0502020202020204" pitchFamily="34" charset="0"/>
+            </a:endParaRPr>
+          </a:p>
+          <a:p>
+            <a:pPr marL="457200" lvl="1" indent="0">
+              <a:lnSpc>
+                <a:spcPct val="110000"/>
+              </a:lnSpc>
+              <a:buNone/>
+            </a:pPr>
+            <a:endParaRPr lang="en-IN" sz="1800" b="1" i="1" dirty="0" smtClean="0">
+              <a:latin typeface="Century Gothic" panose="020B0502020202020204" pitchFamily="34" charset="0"/>
+            </a:endParaRPr>
+          </a:p>
+          <a:p>
+            <a:pPr marL="457200" lvl="1" indent="0">
+              <a:lnSpc>
+                <a:spcPct val="110000"/>
+              </a:lnSpc>
+              <a:buNone/>
+            </a:pPr>
             <a:r>
               <a:rPr lang="en-IN" sz="1800" b="1" i="1" dirty="0" smtClean="0">
                 <a:latin typeface="Century Gothic" panose="020B0502020202020204" pitchFamily="34" charset="0"/>
@@ -9184,11 +8617,17 @@
             </a:r>
             <a:r>
               <a:rPr lang="en-IN" sz="1800" b="1" i="1" dirty="0">
+                <a:solidFill>
+                  <a:srgbClr val="FF0000"/>
+                </a:solidFill>
                 <a:latin typeface="Century Gothic" panose="020B0502020202020204" pitchFamily="34" charset="0"/>
               </a:rPr>
               <a:t>git merge [bookmark]/[branch] </a:t>
             </a:r>
             <a:endParaRPr lang="en-IN" sz="1800" b="1" i="1" dirty="0" smtClean="0">
+              <a:solidFill>
+                <a:srgbClr val="FF0000"/>
+              </a:solidFill>
               <a:latin typeface="Century Gothic" panose="020B0502020202020204" pitchFamily="34" charset="0"/>
             </a:endParaRPr>
           </a:p>
@@ -9302,8 +8741,11 @@
               <a:rPr lang="en-IN" sz="1800" b="1" i="1" dirty="0">
                 <a:latin typeface="Century Gothic" panose="020B0502020202020204" pitchFamily="34" charset="0"/>
               </a:rPr>
-              <a:t>git push [alias] [branch] </a:t>
-            </a:r>
+              <a:t>git push </a:t>
+            </a:r>
+            <a:endParaRPr lang="en-IN" sz="1800" b="1" i="1" dirty="0" smtClean="0">
+              <a:latin typeface="Century Gothic" panose="020B0502020202020204" pitchFamily="34" charset="0"/>
+            </a:endParaRPr>
           </a:p>
           <a:p>
             <a:pPr marL="457200" lvl="1" indent="0">
@@ -9313,16 +8755,18 @@
               <a:buNone/>
             </a:pPr>
             <a:r>
+              <a:rPr lang="en-US" sz="1800" dirty="0" smtClean="0"/>
+              <a:t>Uploads </a:t>
+            </a:r>
+            <a:r>
               <a:rPr lang="en-US" sz="1800" dirty="0"/>
-              <a:t>Uploads all local branch commits to </a:t>
-            </a:r>
-            <a:r>
-              <a:rPr lang="en-US" sz="1800" dirty="0" err="1"/>
+              <a:t>all local branch commits to </a:t>
+            </a:r>
+            <a:r>
+              <a:rPr lang="en-US" sz="1800" dirty="0" err="1" smtClean="0"/>
               <a:t>GitHub</a:t>
             </a:r>
-            <a:endParaRPr lang="en-IN" sz="1800" b="1" i="1" dirty="0">
-              <a:latin typeface="Century Gothic" panose="020B0502020202020204" pitchFamily="34" charset="0"/>
-            </a:endParaRPr>
+            <a:endParaRPr lang="en-US" sz="1800" dirty="0" smtClean="0"/>
           </a:p>
           <a:p>
             <a:pPr marL="457200" lvl="1" indent="0">
@@ -9331,12 +8775,9 @@
               </a:lnSpc>
               <a:buNone/>
             </a:pPr>
-            <a:r>
-              <a:rPr lang="en-IN" sz="1800" b="1" i="1" dirty="0">
-                <a:latin typeface="Century Gothic" panose="020B0502020202020204" pitchFamily="34" charset="0"/>
-              </a:rPr>
-              <a:t>$ git pull</a:t>
-            </a:r>
+            <a:endParaRPr lang="en-IN" sz="1800" b="1" i="1" dirty="0">
+              <a:latin typeface="Century Gothic" panose="020B0502020202020204" pitchFamily="34" charset="0"/>
+            </a:endParaRPr>
           </a:p>
           <a:p>
             <a:pPr marL="457200" lvl="1" indent="0">
@@ -9346,34 +8787,10 @@
               <a:buNone/>
             </a:pPr>
             <a:r>
-              <a:rPr lang="en-US" sz="1800" dirty="0">
-                <a:latin typeface="Century Gothic" panose="020B0502020202020204" pitchFamily="34" charset="0"/>
-              </a:rPr>
-              <a:t>The workflow of </a:t>
-            </a:r>
-            <a:r>
-              <a:rPr lang="en-US" sz="1800" i="1" dirty="0">
-                <a:latin typeface="Century Gothic" panose="020B0502020202020204" pitchFamily="34" charset="0"/>
-              </a:rPr>
-              <a:t>fetching</a:t>
-            </a:r>
-            <a:r>
-              <a:rPr lang="en-US" sz="1800" dirty="0">
-                <a:latin typeface="Century Gothic" panose="020B0502020202020204" pitchFamily="34" charset="0"/>
-              </a:rPr>
-              <a:t> remote changes and then </a:t>
-            </a:r>
-            <a:r>
-              <a:rPr lang="en-US" sz="1800" i="1" dirty="0">
-                <a:latin typeface="Century Gothic" panose="020B0502020202020204" pitchFamily="34" charset="0"/>
-              </a:rPr>
-              <a:t>merging</a:t>
-            </a:r>
-            <a:r>
-              <a:rPr lang="en-US" sz="1800" dirty="0">
-                <a:latin typeface="Century Gothic" panose="020B0502020202020204" pitchFamily="34" charset="0"/>
-              </a:rPr>
-              <a:t> them</a:t>
+              <a:rPr lang="en-IN" sz="1800" b="1" i="1" dirty="0">
+                <a:latin typeface="Century Gothic" panose="020B0502020202020204" pitchFamily="34" charset="0"/>
+              </a:rPr>
+              <a:t>$ git pull</a:t>
             </a:r>
           </a:p>
           <a:p>
@@ -9384,10 +8801,34 @@
               <a:buNone/>
             </a:pPr>
             <a:r>
-              <a:rPr lang="en-IN" sz="1800" b="1" i="1" dirty="0">
-                <a:latin typeface="Century Gothic" panose="020B0502020202020204" pitchFamily="34" charset="0"/>
-              </a:rPr>
-              <a:t>$ git cherry-pick &lt;commit-1&gt; &lt;commit-2&gt;……&lt;commit-n&gt;</a:t>
+              <a:rPr lang="en-US" sz="1800" dirty="0">
+                <a:latin typeface="Century Gothic" panose="020B0502020202020204" pitchFamily="34" charset="0"/>
+              </a:rPr>
+              <a:t>The workflow of </a:t>
+            </a:r>
+            <a:r>
+              <a:rPr lang="en-US" sz="1800" i="1" dirty="0">
+                <a:latin typeface="Century Gothic" panose="020B0502020202020204" pitchFamily="34" charset="0"/>
+              </a:rPr>
+              <a:t>fetching</a:t>
+            </a:r>
+            <a:r>
+              <a:rPr lang="en-US" sz="1800" dirty="0">
+                <a:latin typeface="Century Gothic" panose="020B0502020202020204" pitchFamily="34" charset="0"/>
+              </a:rPr>
+              <a:t> remote changes and then </a:t>
+            </a:r>
+            <a:r>
+              <a:rPr lang="en-US" sz="1800" i="1" dirty="0">
+                <a:latin typeface="Century Gothic" panose="020B0502020202020204" pitchFamily="34" charset="0"/>
+              </a:rPr>
+              <a:t>merging</a:t>
+            </a:r>
+            <a:r>
+              <a:rPr lang="en-US" sz="1800" dirty="0">
+                <a:latin typeface="Century Gothic" panose="020B0502020202020204" pitchFamily="34" charset="0"/>
+              </a:rPr>
+              <a:t> them</a:t>
             </a:r>
           </a:p>
           <a:p>
@@ -9397,8 +8838,45 @@
               </a:lnSpc>
               <a:buNone/>
             </a:pPr>
-            <a:r>
-              <a:rPr lang="en-IN" sz="1800" dirty="0"/>
+            <a:endParaRPr lang="en-IN" sz="1800" b="1" i="1" dirty="0" smtClean="0">
+              <a:latin typeface="Century Gothic" panose="020B0502020202020204" pitchFamily="34" charset="0"/>
+            </a:endParaRPr>
+          </a:p>
+          <a:p>
+            <a:pPr marL="457200" lvl="1" indent="0">
+              <a:lnSpc>
+                <a:spcPct val="110000"/>
+              </a:lnSpc>
+              <a:buNone/>
+            </a:pPr>
+            <a:r>
+              <a:rPr lang="en-IN" sz="1800" b="1" i="1" dirty="0" smtClean="0">
+                <a:latin typeface="Century Gothic" panose="020B0502020202020204" pitchFamily="34" charset="0"/>
+              </a:rPr>
+              <a:t>$ git </a:t>
+            </a:r>
+            <a:r>
+              <a:rPr lang="en-IN" sz="1800" b="1" i="1" dirty="0">
+                <a:latin typeface="Century Gothic" panose="020B0502020202020204" pitchFamily="34" charset="0"/>
+              </a:rPr>
+              <a:t>cherry-pick &lt;</a:t>
+            </a:r>
+            <a:r>
+              <a:rPr lang="en-IN" sz="1800" b="1" i="1" dirty="0" smtClean="0">
+                <a:latin typeface="Century Gothic" panose="020B0502020202020204" pitchFamily="34" charset="0"/>
+              </a:rPr>
+              <a:t>commit hash&gt; </a:t>
+            </a:r>
+          </a:p>
+          <a:p>
+            <a:pPr marL="457200" lvl="1" indent="0">
+              <a:lnSpc>
+                <a:spcPct val="110000"/>
+              </a:lnSpc>
+              <a:buNone/>
+            </a:pPr>
+            <a:r>
+              <a:rPr lang="en-IN" sz="1800" dirty="0" smtClean="0"/>
               <a:t>C</a:t>
             </a:r>
             <a:r>
@@ -9421,6 +8899,36 @@
           </a:p>
         </p:txBody>
       </p:sp>
+      <p:pic>
+        <p:nvPicPr>
+          <p:cNvPr id="2" name="Picture 1"/>
+          <p:cNvPicPr>
+            <a:picLocks noChangeAspect="1"/>
+          </p:cNvPicPr>
+          <p:nvPr/>
+        </p:nvPicPr>
+        <p:blipFill>
+          <a:blip r:embed="rId2">
+            <a:extLst>
+              <a:ext uri="{28A0092B-C50C-407E-A947-70E740481C1C}">
+                <a14:useLocalDpi xmlns:a14="http://schemas.microsoft.com/office/drawing/2010/main" val="0"/>
+              </a:ext>
+            </a:extLst>
+          </a:blip>
+          <a:stretch>
+            <a:fillRect/>
+          </a:stretch>
+        </p:blipFill>
+        <p:spPr>
+          <a:xfrm>
+            <a:off x="1361728" y="2155379"/>
+            <a:ext cx="4444162" cy="1006226"/>
+          </a:xfrm>
+          <a:prstGeom prst="rect">
+            <a:avLst/>
+          </a:prstGeom>
+        </p:spPr>
+      </p:pic>
     </p:spTree>
     <p:extLst>
       <p:ext uri="{BB962C8B-B14F-4D97-AF65-F5344CB8AC3E}">
@@ -11499,14 +11007,7 @@
                 <a:latin typeface="Century Gothic" panose="020B0502020202020204" pitchFamily="34" charset="0"/>
                 <a:cs typeface="Times New Roman" panose="02020603050405020304" pitchFamily="18" charset="0"/>
               </a:rPr>
-              <a:t>Why Git</a:t>
-            </a:r>
-            <a:r>
-              <a:rPr lang="en-IN" sz="2400" dirty="0" smtClean="0">
-                <a:latin typeface="Century Gothic" panose="020B0502020202020204" pitchFamily="34" charset="0"/>
-                <a:cs typeface="Times New Roman" panose="02020603050405020304" pitchFamily="18" charset="0"/>
-              </a:rPr>
-              <a:t>?</a:t>
+              <a:t>Why Git?</a:t>
             </a:r>
           </a:p>
           <a:p>
@@ -11524,10 +11025,6 @@
               </a:rPr>
               <a:t>Overview</a:t>
             </a:r>
-            <a:endParaRPr lang="en-IN" sz="2400" dirty="0" smtClean="0">
-              <a:latin typeface="Century Gothic" panose="020B0502020202020204" pitchFamily="34" charset="0"/>
-              <a:cs typeface="Times New Roman" panose="02020603050405020304" pitchFamily="18" charset="0"/>
-            </a:endParaRPr>
           </a:p>
           <a:p>
             <a:pPr marL="2743200" lvl="5" indent="-457200">
@@ -11706,13 +11203,7 @@
               <a:rPr lang="en-US" sz="1800" dirty="0" smtClean="0">
                 <a:latin typeface="Century Gothic" panose="020B0502020202020204" pitchFamily="34" charset="0"/>
               </a:rPr>
-              <a:t> </a:t>
-            </a:r>
-            <a:r>
-              <a:rPr lang="en-US" sz="1800" dirty="0" smtClean="0">
-                <a:latin typeface="Century Gothic" panose="020B0502020202020204" pitchFamily="34" charset="0"/>
-              </a:rPr>
-              <a:t>is an </a:t>
+              <a:t> is an </a:t>
             </a:r>
             <a:r>
               <a:rPr lang="en-US" sz="1800" b="1" i="1" dirty="0">
@@ -12781,7 +12272,6 @@
               <a:rPr lang="en-US" dirty="0"/>
               <a:t>the changes</a:t>
             </a:r>
-            <a:endParaRPr lang="en-US" dirty="0"/>
           </a:p>
         </p:txBody>
       </p:sp>
@@ -13536,11 +13026,7 @@
           <a:p>
             <a:r>
               <a:rPr lang="en-IN" dirty="0" smtClean="0"/>
-              <a:t>OVERVIEW</a:t>
-            </a:r>
-            <a:r>
-              <a:rPr lang="en-IN" dirty="0" smtClean="0"/>
-              <a:t> </a:t>
+              <a:t>OVERVIEW </a:t>
             </a:r>
             <a:endParaRPr lang="en-IN" dirty="0"/>
           </a:p>
@@ -14023,7 +13509,7 @@
       </p:sp>
       <p:pic>
         <p:nvPicPr>
-          <p:cNvPr id="3" name="Picture 2"/>
+          <p:cNvPr id="2" name="Picture 1"/>
           <p:cNvPicPr>
             <a:picLocks noChangeAspect="1"/>
           </p:cNvPicPr>
@@ -14043,8 +13529,8 @@
         </p:blipFill>
         <p:spPr>
           <a:xfrm>
-            <a:off x="1363514" y="3058698"/>
-            <a:ext cx="4286168" cy="500053"/>
+            <a:off x="6747409" y="3361072"/>
+            <a:ext cx="4456745" cy="367126"/>
           </a:xfrm>
           <a:prstGeom prst="rect">
             <a:avLst/>
@@ -14053,7 +13539,7 @@
       </p:pic>
       <p:pic>
         <p:nvPicPr>
-          <p:cNvPr id="4" name="Picture 3"/>
+          <p:cNvPr id="5" name="Picture 4"/>
           <p:cNvPicPr>
             <a:picLocks noChangeAspect="1"/>
           </p:cNvPicPr>
@@ -14073,8 +13559,8 @@
         </p:blipFill>
         <p:spPr>
           <a:xfrm>
-            <a:off x="1363514" y="4797911"/>
-            <a:ext cx="4093589" cy="1086523"/>
+            <a:off x="6747409" y="4966435"/>
+            <a:ext cx="4456745" cy="812089"/>
           </a:xfrm>
           <a:prstGeom prst="rect">
             <a:avLst/>
@@ -14083,7 +13569,7 @@
       </p:pic>
       <p:pic>
         <p:nvPicPr>
-          <p:cNvPr id="15" name="Picture 14"/>
+          <p:cNvPr id="7" name="Picture 6"/>
           <p:cNvPicPr>
             <a:picLocks noChangeAspect="1"/>
           </p:cNvPicPr>
@@ -14103,8 +13589,8 @@
         </p:blipFill>
         <p:spPr>
           <a:xfrm>
-            <a:off x="6716205" y="3248090"/>
-            <a:ext cx="4093589" cy="756187"/>
+            <a:off x="1374520" y="2962201"/>
+            <a:ext cx="4273623" cy="398871"/>
           </a:xfrm>
           <a:prstGeom prst="rect">
             <a:avLst/>
@@ -14113,7 +13599,7 @@
       </p:pic>
       <p:pic>
         <p:nvPicPr>
-          <p:cNvPr id="16" name="Picture 15"/>
+          <p:cNvPr id="8" name="Picture 7"/>
           <p:cNvPicPr>
             <a:picLocks noChangeAspect="1"/>
           </p:cNvPicPr>
@@ -14133,8 +13619,8 @@
         </p:blipFill>
         <p:spPr>
           <a:xfrm>
-            <a:off x="6716205" y="4926761"/>
-            <a:ext cx="4093589" cy="1036243"/>
+            <a:off x="1374520" y="4895448"/>
+            <a:ext cx="4273623" cy="621618"/>
           </a:xfrm>
           <a:prstGeom prst="rect">
             <a:avLst/>
@@ -14872,7 +14358,7 @@
       </p:sp>
       <p:pic>
         <p:nvPicPr>
-          <p:cNvPr id="12" name="Picture 11"/>
+          <p:cNvPr id="2" name="Picture 1"/>
           <p:cNvPicPr>
             <a:picLocks noChangeAspect="1"/>
           </p:cNvPicPr>
@@ -14892,8 +14378,8 @@
         </p:blipFill>
         <p:spPr>
           <a:xfrm>
-            <a:off x="1414170" y="1602756"/>
-            <a:ext cx="4605630" cy="618979"/>
+            <a:off x="1392964" y="1539811"/>
+            <a:ext cx="4544192" cy="575428"/>
           </a:xfrm>
           <a:prstGeom prst="rect">
             <a:avLst/>
@@ -14902,7 +14388,7 @@
       </p:pic>
       <p:pic>
         <p:nvPicPr>
-          <p:cNvPr id="13" name="Picture 12"/>
+          <p:cNvPr id="3" name="Picture 2"/>
           <p:cNvPicPr>
             <a:picLocks noChangeAspect="1"/>
           </p:cNvPicPr>
@@ -14922,8 +14408,8 @@
         </p:blipFill>
         <p:spPr>
           <a:xfrm>
-            <a:off x="1414170" y="3335908"/>
-            <a:ext cx="4605630" cy="538732"/>
+            <a:off x="1392963" y="3392287"/>
+            <a:ext cx="4544193" cy="444169"/>
           </a:xfrm>
           <a:prstGeom prst="rect">
             <a:avLst/>
@@ -14932,7 +14418,7 @@
       </p:pic>
       <p:pic>
         <p:nvPicPr>
-          <p:cNvPr id="14" name="Picture 13"/>
+          <p:cNvPr id="4" name="Picture 3"/>
           <p:cNvPicPr>
             <a:picLocks noChangeAspect="1"/>
           </p:cNvPicPr>
@@ -14952,8 +14438,8 @@
         </p:blipFill>
         <p:spPr>
           <a:xfrm>
-            <a:off x="1414170" y="4881397"/>
-            <a:ext cx="4605630" cy="697183"/>
+            <a:off x="6727145" y="4165633"/>
+            <a:ext cx="4388874" cy="802354"/>
           </a:xfrm>
           <a:prstGeom prst="rect">
             <a:avLst/>
@@ -14962,7 +14448,7 @@
       </p:pic>
       <p:pic>
         <p:nvPicPr>
-          <p:cNvPr id="15" name="Picture 14"/>
+          <p:cNvPr id="5" name="Picture 4"/>
           <p:cNvPicPr>
             <a:picLocks noChangeAspect="1"/>
           </p:cNvPicPr>
@@ -14982,8 +14468,8 @@
         </p:blipFill>
         <p:spPr>
           <a:xfrm>
-            <a:off x="6748169" y="4168030"/>
-            <a:ext cx="4605630" cy="779986"/>
+            <a:off x="1392963" y="4866033"/>
+            <a:ext cx="4545129" cy="915810"/>
           </a:xfrm>
           <a:prstGeom prst="rect">
             <a:avLst/>
@@ -14992,7 +14478,7 @@
       </p:pic>
       <p:pic>
         <p:nvPicPr>
-          <p:cNvPr id="16" name="Picture 15"/>
+          <p:cNvPr id="6" name="Picture 5"/>
           <p:cNvPicPr>
             <a:picLocks noChangeAspect="1"/>
           </p:cNvPicPr>
@@ -15012,8 +14498,8 @@
         </p:blipFill>
         <p:spPr>
           <a:xfrm>
-            <a:off x="6748169" y="1842379"/>
-            <a:ext cx="4643730" cy="1343618"/>
+            <a:off x="6727145" y="1990525"/>
+            <a:ext cx="4388874" cy="825468"/>
           </a:xfrm>
           <a:prstGeom prst="rect">
             <a:avLst/>

</xml_diff>